<commit_message>
edit simple graph slides
</commit_message>
<xml_diff>
--- a/spring13/slides13/bipartite-matching.pptx
+++ b/spring13/slides13/bipartite-matching.pptx
@@ -2995,14 +2995,7 @@
                 <a:latin typeface="Comic Sans MS" pitchFamily="66" charset="0"/>
                 <a:ea typeface="宋体" pitchFamily="2" charset="-122"/>
               </a:rPr>
-              <a:t>Albert R Meyer.     </a:t>
-            </a:r>
-            <a:r>
-              <a:rPr lang="en-US" altLang="zh-CN" sz="1000" dirty="0" smtClean="0">
-                <a:latin typeface="Comic Sans MS" pitchFamily="66" charset="0"/>
-                <a:ea typeface="宋体" pitchFamily="2" charset="-122"/>
-              </a:rPr>
-              <a:t>April</a:t>
+              <a:t>Albert R Meyer.     April</a:t>
             </a:r>
             <a:r>
               <a:rPr lang="en-US" altLang="zh-CN" sz="1000" baseline="0" dirty="0" smtClean="0">
@@ -3631,12 +3624,12 @@
   <p:clrMapOvr>
     <a:masterClrMapping/>
   </p:clrMapOvr>
-  <mc:AlternateContent xmlns:mc="http://schemas.openxmlformats.org/markup-compatibility/2006" xmlns:p14="http://schemas.microsoft.com/office/powerpoint/2010/main">
-    <mc:Choice Requires="p14">
-      <p:transition p14:dur="0"/>
+  <mc:AlternateContent xmlns:mc="http://schemas.openxmlformats.org/markup-compatibility/2006">
+    <mc:Choice xmlns:p14="http://schemas.microsoft.com/office/powerpoint/2010/main" Requires="p14">
+      <p:transition p14:dur="0" advClick="0"/>
     </mc:Choice>
-    <mc:Fallback xmlns="">
-      <p:transition xmlns:p14="http://schemas.microsoft.com/office/powerpoint/2010/main"/>
+    <mc:Fallback>
+      <p:transition xmlns:p14="http://schemas.microsoft.com/office/powerpoint/2010/main" advClick="0"/>
     </mc:Fallback>
   </mc:AlternateContent>
   <p:timing>
@@ -5926,7 +5919,6 @@
               <a:rPr lang="en-US" sz="5400" dirty="0" smtClean="0"/>
               <a:t>Not obvious.  Discuss next.</a:t>
             </a:r>
-            <a:endParaRPr lang="en-US" sz="5400" dirty="0" smtClean="0"/>
           </a:p>
         </p:txBody>
       </p:sp>
@@ -8344,9 +8336,18 @@
   <p:clrMapOvr>
     <a:masterClrMapping/>
   </p:clrMapOvr>
-  <p:transition xmlns:p14="http://schemas.microsoft.com/office/powerpoint/2010/main">
-    <p:fade/>
-  </p:transition>
+  <mc:AlternateContent xmlns:mc="http://schemas.openxmlformats.org/markup-compatibility/2006">
+    <mc:Choice xmlns:p14="http://schemas.microsoft.com/office/powerpoint/2010/main" Requires="p14">
+      <p:transition spd="slow" p14:dur="800" advClick="0">
+        <p:fade/>
+      </p:transition>
+    </mc:Choice>
+    <mc:Fallback>
+      <p:transition xmlns:p14="http://schemas.microsoft.com/office/powerpoint/2010/main" spd="slow" advClick="0">
+        <p:fade/>
+      </p:transition>
+    </mc:Fallback>
+  </mc:AlternateContent>
   <p:timing>
     <p:tnLst>
       <p:par>
@@ -9266,9 +9267,18 @@
   <p:clrMapOvr>
     <a:masterClrMapping/>
   </p:clrMapOvr>
-  <p:transition xmlns:p14="http://schemas.microsoft.com/office/powerpoint/2010/main" spd="med">
-    <p:fade/>
-  </p:transition>
+  <mc:AlternateContent xmlns:mc="http://schemas.openxmlformats.org/markup-compatibility/2006">
+    <mc:Choice xmlns:p14="http://schemas.microsoft.com/office/powerpoint/2010/main" Requires="p14">
+      <p:transition spd="slow" p14:dur="850" advClick="0">
+        <p:fade/>
+      </p:transition>
+    </mc:Choice>
+    <mc:Fallback>
+      <p:transition xmlns:p14="http://schemas.microsoft.com/office/powerpoint/2010/main" spd="slow" advClick="0">
+        <p:fade/>
+      </p:transition>
+    </mc:Fallback>
+  </mc:AlternateContent>
   <p:timing>
     <p:tnLst>
       <p:par>
@@ -10277,8 +10287,8 @@
   <p:clrMapOvr>
     <a:masterClrMapping/>
   </p:clrMapOvr>
-  <p:transition xmlns:p14="http://schemas.microsoft.com/office/powerpoint/2010/main" spd="slow">
-    <p:fade thruBlk="1"/>
+  <p:transition xmlns:p14="http://schemas.microsoft.com/office/powerpoint/2010/main" spd="slow" advClick="0">
+    <p:fade/>
   </p:transition>
   <p:timing>
     <p:tnLst>
@@ -11204,9 +11214,18 @@
   <p:clrMapOvr>
     <a:masterClrMapping/>
   </p:clrMapOvr>
-  <p:transition xmlns:p14="http://schemas.microsoft.com/office/powerpoint/2010/main" advTm="1000">
-    <p:fade/>
-  </p:transition>
+  <mc:AlternateContent xmlns:mc="http://schemas.openxmlformats.org/markup-compatibility/2006">
+    <mc:Choice xmlns:p14="http://schemas.microsoft.com/office/powerpoint/2010/main" Requires="p14">
+      <p:transition spd="slow" p14:dur="800" advClick="0">
+        <p:fade/>
+      </p:transition>
+    </mc:Choice>
+    <mc:Fallback>
+      <p:transition xmlns:p14="http://schemas.microsoft.com/office/powerpoint/2010/main" spd="slow" advClick="0">
+        <p:fade/>
+      </p:transition>
+    </mc:Fallback>
+  </mc:AlternateContent>
   <p:timing>
     <p:tnLst>
       <p:par>
@@ -12149,7 +12168,7 @@
   <p:clrMapOvr>
     <a:masterClrMapping/>
   </p:clrMapOvr>
-  <p:transition xmlns:p14="http://schemas.microsoft.com/office/powerpoint/2010/main" spd="slow">
+  <p:transition xmlns:p14="http://schemas.microsoft.com/office/powerpoint/2010/main" spd="slow" advClick="0">
     <p:fade/>
   </p:transition>
   <p:timing>

</xml_diff>